<commit_message>
init renv but deactivate it; also update annotation in fig1
</commit_message>
<xml_diff>
--- a/output/AgLabor/AgLabor/Fig1_annotated.pptx
+++ b/output/AgLabor/AgLabor/Fig1_annotated.pptx
@@ -5,7 +5,7 @@
     <p:sldMasterId id="2147483660" r:id="rId1"/>
   </p:sldMasterIdLst>
   <p:sldIdLst>
-    <p:sldId id="256" r:id="rId2"/>
+    <p:sldId id="257" r:id="rId2"/>
   </p:sldIdLst>
   <p:sldSz cx="13716000" cy="10972800"/>
   <p:notesSz cx="6858000" cy="9144000"/>
@@ -243,7 +243,7 @@
           <a:p>
             <a:fld id="{2C4E3507-D0DB-42FD-B0F2-F577298B524D}" type="datetimeFigureOut">
               <a:rPr lang="en-US" smtClean="0"/>
-              <a:t>7/9/2024</a:t>
+              <a:t>7/14/2024</a:t>
             </a:fld>
             <a:endParaRPr lang="en-US"/>
           </a:p>
@@ -413,7 +413,7 @@
           <a:p>
             <a:fld id="{2C4E3507-D0DB-42FD-B0F2-F577298B524D}" type="datetimeFigureOut">
               <a:rPr lang="en-US" smtClean="0"/>
-              <a:t>7/9/2024</a:t>
+              <a:t>7/14/2024</a:t>
             </a:fld>
             <a:endParaRPr lang="en-US"/>
           </a:p>
@@ -593,7 +593,7 @@
           <a:p>
             <a:fld id="{2C4E3507-D0DB-42FD-B0F2-F577298B524D}" type="datetimeFigureOut">
               <a:rPr lang="en-US" smtClean="0"/>
-              <a:t>7/9/2024</a:t>
+              <a:t>7/14/2024</a:t>
             </a:fld>
             <a:endParaRPr lang="en-US"/>
           </a:p>
@@ -763,7 +763,7 @@
           <a:p>
             <a:fld id="{2C4E3507-D0DB-42FD-B0F2-F577298B524D}" type="datetimeFigureOut">
               <a:rPr lang="en-US" smtClean="0"/>
-              <a:t>7/9/2024</a:t>
+              <a:t>7/14/2024</a:t>
             </a:fld>
             <a:endParaRPr lang="en-US"/>
           </a:p>
@@ -1007,7 +1007,7 @@
           <a:p>
             <a:fld id="{2C4E3507-D0DB-42FD-B0F2-F577298B524D}" type="datetimeFigureOut">
               <a:rPr lang="en-US" smtClean="0"/>
-              <a:t>7/9/2024</a:t>
+              <a:t>7/14/2024</a:t>
             </a:fld>
             <a:endParaRPr lang="en-US"/>
           </a:p>
@@ -1239,7 +1239,7 @@
           <a:p>
             <a:fld id="{2C4E3507-D0DB-42FD-B0F2-F577298B524D}" type="datetimeFigureOut">
               <a:rPr lang="en-US" smtClean="0"/>
-              <a:t>7/9/2024</a:t>
+              <a:t>7/14/2024</a:t>
             </a:fld>
             <a:endParaRPr lang="en-US"/>
           </a:p>
@@ -1606,7 +1606,7 @@
           <a:p>
             <a:fld id="{2C4E3507-D0DB-42FD-B0F2-F577298B524D}" type="datetimeFigureOut">
               <a:rPr lang="en-US" smtClean="0"/>
-              <a:t>7/9/2024</a:t>
+              <a:t>7/14/2024</a:t>
             </a:fld>
             <a:endParaRPr lang="en-US"/>
           </a:p>
@@ -1724,7 +1724,7 @@
           <a:p>
             <a:fld id="{2C4E3507-D0DB-42FD-B0F2-F577298B524D}" type="datetimeFigureOut">
               <a:rPr lang="en-US" smtClean="0"/>
-              <a:t>7/9/2024</a:t>
+              <a:t>7/14/2024</a:t>
             </a:fld>
             <a:endParaRPr lang="en-US"/>
           </a:p>
@@ -1819,7 +1819,7 @@
           <a:p>
             <a:fld id="{2C4E3507-D0DB-42FD-B0F2-F577298B524D}" type="datetimeFigureOut">
               <a:rPr lang="en-US" smtClean="0"/>
-              <a:t>7/9/2024</a:t>
+              <a:t>7/14/2024</a:t>
             </a:fld>
             <a:endParaRPr lang="en-US"/>
           </a:p>
@@ -2096,7 +2096,7 @@
           <a:p>
             <a:fld id="{2C4E3507-D0DB-42FD-B0F2-F577298B524D}" type="datetimeFigureOut">
               <a:rPr lang="en-US" smtClean="0"/>
-              <a:t>7/9/2024</a:t>
+              <a:t>7/14/2024</a:t>
             </a:fld>
             <a:endParaRPr lang="en-US"/>
           </a:p>
@@ -2353,7 +2353,7 @@
           <a:p>
             <a:fld id="{2C4E3507-D0DB-42FD-B0F2-F577298B524D}" type="datetimeFigureOut">
               <a:rPr lang="en-US" smtClean="0"/>
-              <a:t>7/9/2024</a:t>
+              <a:t>7/14/2024</a:t>
             </a:fld>
             <a:endParaRPr lang="en-US"/>
           </a:p>
@@ -2566,7 +2566,7 @@
           <a:p>
             <a:fld id="{2C4E3507-D0DB-42FD-B0F2-F577298B524D}" type="datetimeFigureOut">
               <a:rPr lang="en-US" smtClean="0"/>
-              <a:t>7/9/2024</a:t>
+              <a:t>7/14/2024</a:t>
             </a:fld>
             <a:endParaRPr lang="en-US"/>
           </a:p>
@@ -3024,8 +3024,8 @@
         </p:nvSpPr>
         <p:spPr>
           <a:xfrm rot="2163270">
-            <a:off x="10154346" y="1953410"/>
-            <a:ext cx="1047964" cy="261610"/>
+            <a:off x="10154346" y="1914379"/>
+            <a:ext cx="1047964" cy="307777"/>
           </a:xfrm>
           <a:prstGeom prst="rect">
             <a:avLst/>
@@ -3040,9 +3040,11 @@
           <a:p>
             <a:pPr algn="r"/>
             <a:r>
-              <a:rPr lang="en-US" sz="1100" dirty="0">
+              <a:rPr lang="en-US" sz="1400" dirty="0">
                 <a:solidFill>
-                  <a:srgbClr val="A6CEE3"/>
+                  <a:srgbClr val="0070C0">
+                    <a:alpha val="85000"/>
+                  </a:srgbClr>
                 </a:solidFill>
                 <a:latin typeface="Arial" panose="020B0604020202020204" pitchFamily="34" charset="0"/>
                 <a:cs typeface="Arial" panose="020B0604020202020204" pitchFamily="34" charset="0"/>
@@ -3066,8 +3068,8 @@
         </p:nvSpPr>
         <p:spPr>
           <a:xfrm rot="1862552">
-            <a:off x="10138556" y="3780890"/>
-            <a:ext cx="1047964" cy="261610"/>
+            <a:off x="10138556" y="3757807"/>
+            <a:ext cx="1047964" cy="307777"/>
           </a:xfrm>
           <a:prstGeom prst="rect">
             <a:avLst/>
@@ -3082,7 +3084,7 @@
           <a:p>
             <a:pPr algn="r"/>
             <a:r>
-              <a:rPr lang="en-US" sz="1100" dirty="0">
+              <a:rPr lang="en-US" sz="1400" dirty="0">
                 <a:solidFill>
                   <a:srgbClr val="33A02C"/>
                 </a:solidFill>
@@ -3771,8 +3773,8 @@
         </p:nvSpPr>
         <p:spPr>
           <a:xfrm rot="799251">
-            <a:off x="9747194" y="3104354"/>
-            <a:ext cx="1403261" cy="261610"/>
+            <a:off x="9747194" y="3081271"/>
+            <a:ext cx="1403261" cy="307777"/>
           </a:xfrm>
           <a:prstGeom prst="rect">
             <a:avLst/>
@@ -3787,7 +3789,7 @@
           <a:p>
             <a:pPr algn="r"/>
             <a:r>
-              <a:rPr lang="en-US" sz="1100" dirty="0">
+              <a:rPr lang="en-US" sz="1400" dirty="0">
                 <a:solidFill>
                   <a:srgbClr val="6A3D9A"/>
                 </a:solidFill>
@@ -3813,8 +3815,8 @@
         </p:nvSpPr>
         <p:spPr>
           <a:xfrm rot="646773">
-            <a:off x="10046986" y="4299503"/>
-            <a:ext cx="1047964" cy="276999"/>
+            <a:off x="10046986" y="4284114"/>
+            <a:ext cx="1047964" cy="307777"/>
           </a:xfrm>
           <a:prstGeom prst="rect">
             <a:avLst/>
@@ -3829,7 +3831,7 @@
           <a:p>
             <a:pPr algn="r"/>
             <a:r>
-              <a:rPr lang="en-US" sz="1200" dirty="0">
+              <a:rPr lang="en-US" sz="1400" dirty="0">
                 <a:solidFill>
                   <a:srgbClr val="1F78B4"/>
                 </a:solidFill>
@@ -3855,8 +3857,8 @@
         </p:nvSpPr>
         <p:spPr>
           <a:xfrm>
-            <a:off x="9672559" y="2365947"/>
-            <a:ext cx="1403261" cy="261610"/>
+            <a:off x="9672559" y="2344683"/>
+            <a:ext cx="1403261" cy="307777"/>
           </a:xfrm>
           <a:prstGeom prst="rect">
             <a:avLst/>
@@ -3871,9 +3873,11 @@
           <a:p>
             <a:pPr algn="r"/>
             <a:r>
-              <a:rPr lang="en-US" sz="1100" dirty="0">
+              <a:rPr lang="en-US" sz="1400" dirty="0">
                 <a:solidFill>
-                  <a:srgbClr val="FDBF6F"/>
+                  <a:schemeClr val="accent2">
+                    <a:alpha val="85000"/>
+                  </a:schemeClr>
                 </a:solidFill>
                 <a:latin typeface="Arial" panose="020B0604020202020204" pitchFamily="34" charset="0"/>
                 <a:cs typeface="Arial" panose="020B0604020202020204" pitchFamily="34" charset="0"/>
@@ -3897,8 +3901,8 @@
         </p:nvSpPr>
         <p:spPr>
           <a:xfrm rot="313075">
-            <a:off x="9744746" y="2707367"/>
-            <a:ext cx="1403261" cy="261610"/>
+            <a:off x="9744746" y="2684284"/>
+            <a:ext cx="1403261" cy="307777"/>
           </a:xfrm>
           <a:prstGeom prst="rect">
             <a:avLst/>
@@ -3913,9 +3917,11 @@
           <a:p>
             <a:pPr algn="r"/>
             <a:r>
-              <a:rPr lang="en-US" sz="1100" dirty="0">
+              <a:rPr lang="en-US" sz="1400" dirty="0">
                 <a:solidFill>
-                  <a:srgbClr val="FB9A99"/>
+                  <a:srgbClr val="C00000">
+                    <a:alpha val="70000"/>
+                  </a:srgbClr>
                 </a:solidFill>
                 <a:latin typeface="Arial" panose="020B0604020202020204" pitchFamily="34" charset="0"/>
                 <a:cs typeface="Arial" panose="020B0604020202020204" pitchFamily="34" charset="0"/>
@@ -3939,8 +3945,8 @@
         </p:nvSpPr>
         <p:spPr>
           <a:xfrm rot="396862">
-            <a:off x="6626404" y="2181350"/>
-            <a:ext cx="1403261" cy="261610"/>
+            <a:off x="6626404" y="2158267"/>
+            <a:ext cx="1403261" cy="307777"/>
           </a:xfrm>
           <a:prstGeom prst="rect">
             <a:avLst/>
@@ -3954,9 +3960,11 @@
           <a:lstStyle/>
           <a:p>
             <a:r>
-              <a:rPr lang="en-US" sz="1100" dirty="0">
+              <a:rPr lang="en-US" sz="1400" dirty="0">
                 <a:solidFill>
-                  <a:srgbClr val="B2DF8A"/>
+                  <a:srgbClr val="33A02C">
+                    <a:alpha val="90000"/>
+                  </a:srgbClr>
                 </a:solidFill>
                 <a:latin typeface="Arial" panose="020B0604020202020204" pitchFamily="34" charset="0"/>
                 <a:cs typeface="Arial" panose="020B0604020202020204" pitchFamily="34" charset="0"/>
@@ -4174,7 +4182,7 @@
     </p:spTree>
     <p:extLst>
       <p:ext uri="{BB962C8B-B14F-4D97-AF65-F5344CB8AC3E}">
-        <p14:creationId xmlns:p14="http://schemas.microsoft.com/office/powerpoint/2010/main" val="1831142600"/>
+        <p14:creationId xmlns:p14="http://schemas.microsoft.com/office/powerpoint/2010/main" val="2076339214"/>
       </p:ext>
     </p:extLst>
   </p:cSld>

</xml_diff>